<commit_message>
Dallas TTT edits RJH
</commit_message>
<xml_diff>
--- a/preliminary/Extended memory Controller and the MPAX registers.pptx
+++ b/preliminary/Extended memory Controller and the MPAX registers.pptx
@@ -34,6 +34,9 @@
   </p:sldIdLst>
   <p:sldSz cx="9144000" cy="6858000" type="screen4x3"/>
   <p:notesSz cx="7010400" cy="9296400"/>
+  <p:custDataLst>
+    <p:tags r:id="rId26"/>
+  </p:custDataLst>
   <p:defaultTextStyle>
     <a:defPPr>
       <a:defRPr lang="en-US"/>
@@ -215,7 +218,7 @@
             <a:fld id="{4867E145-FD8E-4D85-A51A-7B0AC52EA425}" type="datetimeFigureOut">
               <a:rPr lang="en-US" smtClean="0"/>
               <a:pPr/>
-              <a:t>7/26/2012</a:t>
+              <a:t>3/15/2013</a:t>
             </a:fld>
             <a:endParaRPr lang="en-US"/>
           </a:p>
@@ -745,7 +748,7 @@
             <a:fld id="{31429989-46B4-45A8-AC69-5792D16FFC61}" type="datetimeFigureOut">
               <a:rPr lang="en-US" smtClean="0"/>
               <a:pPr/>
-              <a:t>7/26/2012</a:t>
+              <a:t>3/15/2013</a:t>
             </a:fld>
             <a:endParaRPr lang="en-US"/>
           </a:p>
@@ -912,7 +915,7 @@
             <a:fld id="{31429989-46B4-45A8-AC69-5792D16FFC61}" type="datetimeFigureOut">
               <a:rPr lang="en-US" smtClean="0"/>
               <a:pPr/>
-              <a:t>7/26/2012</a:t>
+              <a:t>3/15/2013</a:t>
             </a:fld>
             <a:endParaRPr lang="en-US"/>
           </a:p>
@@ -1089,7 +1092,7 @@
             <a:fld id="{31429989-46B4-45A8-AC69-5792D16FFC61}" type="datetimeFigureOut">
               <a:rPr lang="en-US" smtClean="0"/>
               <a:pPr/>
-              <a:t>7/26/2012</a:t>
+              <a:t>3/15/2013</a:t>
             </a:fld>
             <a:endParaRPr lang="en-US"/>
           </a:p>
@@ -1256,7 +1259,7 @@
             <a:fld id="{31429989-46B4-45A8-AC69-5792D16FFC61}" type="datetimeFigureOut">
               <a:rPr lang="en-US" smtClean="0"/>
               <a:pPr/>
-              <a:t>7/26/2012</a:t>
+              <a:t>3/15/2013</a:t>
             </a:fld>
             <a:endParaRPr lang="en-US"/>
           </a:p>
@@ -1499,7 +1502,7 @@
             <a:fld id="{31429989-46B4-45A8-AC69-5792D16FFC61}" type="datetimeFigureOut">
               <a:rPr lang="en-US" smtClean="0"/>
               <a:pPr/>
-              <a:t>7/26/2012</a:t>
+              <a:t>3/15/2013</a:t>
             </a:fld>
             <a:endParaRPr lang="en-US"/>
           </a:p>
@@ -1784,7 +1787,7 @@
             <a:fld id="{31429989-46B4-45A8-AC69-5792D16FFC61}" type="datetimeFigureOut">
               <a:rPr lang="en-US" smtClean="0"/>
               <a:pPr/>
-              <a:t>7/26/2012</a:t>
+              <a:t>3/15/2013</a:t>
             </a:fld>
             <a:endParaRPr lang="en-US"/>
           </a:p>
@@ -2203,7 +2206,7 @@
             <a:fld id="{31429989-46B4-45A8-AC69-5792D16FFC61}" type="datetimeFigureOut">
               <a:rPr lang="en-US" smtClean="0"/>
               <a:pPr/>
-              <a:t>7/26/2012</a:t>
+              <a:t>3/15/2013</a:t>
             </a:fld>
             <a:endParaRPr lang="en-US"/>
           </a:p>
@@ -2318,7 +2321,7 @@
             <a:fld id="{31429989-46B4-45A8-AC69-5792D16FFC61}" type="datetimeFigureOut">
               <a:rPr lang="en-US" smtClean="0"/>
               <a:pPr/>
-              <a:t>7/26/2012</a:t>
+              <a:t>3/15/2013</a:t>
             </a:fld>
             <a:endParaRPr lang="en-US"/>
           </a:p>
@@ -2410,7 +2413,7 @@
             <a:fld id="{31429989-46B4-45A8-AC69-5792D16FFC61}" type="datetimeFigureOut">
               <a:rPr lang="en-US" smtClean="0"/>
               <a:pPr/>
-              <a:t>7/26/2012</a:t>
+              <a:t>3/15/2013</a:t>
             </a:fld>
             <a:endParaRPr lang="en-US"/>
           </a:p>
@@ -2684,7 +2687,7 @@
             <a:fld id="{31429989-46B4-45A8-AC69-5792D16FFC61}" type="datetimeFigureOut">
               <a:rPr lang="en-US" smtClean="0"/>
               <a:pPr/>
-              <a:t>7/26/2012</a:t>
+              <a:t>3/15/2013</a:t>
             </a:fld>
             <a:endParaRPr lang="en-US"/>
           </a:p>
@@ -2934,7 +2937,7 @@
             <a:fld id="{31429989-46B4-45A8-AC69-5792D16FFC61}" type="datetimeFigureOut">
               <a:rPr lang="en-US" smtClean="0"/>
               <a:pPr/>
-              <a:t>7/26/2012</a:t>
+              <a:t>3/15/2013</a:t>
             </a:fld>
             <a:endParaRPr lang="en-US"/>
           </a:p>
@@ -3144,7 +3147,7 @@
             <a:fld id="{31429989-46B4-45A8-AC69-5792D16FFC61}" type="datetimeFigureOut">
               <a:rPr lang="en-US" smtClean="0"/>
               <a:pPr/>
-              <a:t>7/26/2012</a:t>
+              <a:t>3/15/2013</a:t>
             </a:fld>
             <a:endParaRPr lang="en-US"/>
           </a:p>
@@ -15887,7 +15890,7 @@
         <p:spPr>
           <a:xfrm>
             <a:off x="914400" y="1447800"/>
-            <a:ext cx="7239000" cy="4801314"/>
+            <a:ext cx="7239000" cy="5078313"/>
           </a:xfrm>
           <a:prstGeom prst="rect">
             <a:avLst/>
@@ -15905,7 +15908,15 @@
             </a:r>
             <a:r>
               <a:rPr lang="en-US" dirty="0"/>
-              <a:t>reset, the MPAX segment 0 register pair has initial values that set up </a:t>
+              <a:t>reset, the MPAX segment </a:t>
+            </a:r>
+            <a:r>
+              <a:rPr lang="en-US" dirty="0" smtClean="0"/>
+              <a:t>0 of each set </a:t>
+            </a:r>
+            <a:r>
+              <a:rPr lang="en-US" dirty="0"/>
+              <a:t>register pair has initial values that set up </a:t>
             </a:r>
             <a:r>
               <a:rPr lang="en-US" dirty="0" smtClean="0"/>
@@ -15913,7 +15924,15 @@
             </a:r>
             <a:r>
               <a:rPr lang="en-US" dirty="0"/>
-              <a:t>to the full MSMC SRAM address space and 2 GB of the EMIF address space</a:t>
+              <a:t>to the full MSMC SRAM address space and 2 GB of the </a:t>
+            </a:r>
+            <a:r>
+              <a:rPr lang="en-US" dirty="0" smtClean="0"/>
+              <a:t>DDR </a:t>
+            </a:r>
+            <a:r>
+              <a:rPr lang="en-US" dirty="0"/>
+              <a:t>address space</a:t>
             </a:r>
             <a:r>
               <a:rPr lang="en-US" dirty="0" smtClean="0"/>
@@ -15921,9 +15940,16 @@
             </a:r>
           </a:p>
           <a:p>
+            <a:endParaRPr lang="en-US" dirty="0" smtClean="0"/>
+          </a:p>
+          <a:p>
+            <a:r>
+              <a:rPr lang="en-US" smtClean="0"/>
+              <a:t>All </a:t>
+            </a:r>
             <a:r>
               <a:rPr lang="en-US" dirty="0" smtClean="0"/>
-              <a:t> All other </a:t>
+              <a:t>other </a:t>
             </a:r>
             <a:r>
               <a:rPr lang="en-US" dirty="0"/>
@@ -19022,36 +19048,14 @@
           <a:p>
             <a:r>
               <a:rPr lang="en-US" sz="2000" dirty="0" smtClean="0"/>
-              <a:t>// Map 1 </a:t>
-            </a:r>
+              <a:t>// Map 1 GB from 0x8000_0000 to 8 different addresses in the external memory</a:t>
+            </a:r>
+          </a:p>
+          <a:p>
             <a:r>
               <a:rPr lang="en-US" sz="2000" dirty="0" smtClean="0"/>
-              <a:t>GB </a:t>
-            </a:r>
-            <a:r>
-              <a:rPr lang="en-US" sz="2000" dirty="0" smtClean="0"/>
-              <a:t>from </a:t>
-            </a:r>
-            <a:r>
-              <a:rPr lang="en-US" sz="2000" dirty="0" smtClean="0"/>
-              <a:t>0x8000_0000 to 8 different addresses in the external memory</a:t>
-            </a:r>
-            <a:endParaRPr lang="en-US" sz="2000" dirty="0" smtClean="0"/>
-          </a:p>
-          <a:p>
-            <a:r>
-              <a:rPr lang="en-US" sz="2000" dirty="0" smtClean="0"/>
-              <a:t>// </a:t>
-            </a:r>
-            <a:r>
-              <a:rPr lang="en-US" sz="2000" dirty="0" smtClean="0"/>
-              <a:t>The purpose is to </a:t>
-            </a:r>
-            <a:r>
-              <a:rPr lang="en-US" sz="2000" dirty="0" smtClean="0"/>
-              <a:t>give each core different physical address but have the same logical address</a:t>
-            </a:r>
-            <a:endParaRPr lang="en-US" sz="2000" dirty="0" smtClean="0"/>
+              <a:t>// The purpose is to give each core different physical address but have the same logical address</a:t>
+            </a:r>
           </a:p>
           <a:p>
             <a:r>
@@ -19060,17 +19064,8 @@
             </a:r>
             <a:r>
               <a:rPr lang="en-US" sz="2000" dirty="0" smtClean="0"/>
-              <a:t> </a:t>
-            </a:r>
-            <a:r>
-              <a:rPr lang="en-US" sz="2000" dirty="0" smtClean="0"/>
-              <a:t>= </a:t>
-            </a:r>
-            <a:r>
-              <a:rPr lang="en-US" sz="2000" dirty="0" smtClean="0"/>
-              <a:t>0x1D;  //  1GB   </a:t>
-            </a:r>
-            <a:endParaRPr lang="en-US" sz="2000" dirty="0" smtClean="0"/>
+              <a:t> = 0x1D;  //  1GB   </a:t>
+            </a:r>
           </a:p>
           <a:p>
             <a:r>
@@ -19083,29 +19078,8 @@
             </a:r>
             <a:r>
               <a:rPr lang="en-US" sz="2000" dirty="0" smtClean="0"/>
-              <a:t> = </a:t>
-            </a:r>
-            <a:r>
-              <a:rPr lang="en-US" sz="2000" dirty="0" smtClean="0"/>
-              <a:t>0x2; </a:t>
-            </a:r>
-            <a:r>
-              <a:rPr lang="en-US" sz="2000" dirty="0" smtClean="0"/>
-              <a:t>// </a:t>
-            </a:r>
-            <a:r>
-              <a:rPr lang="en-US" sz="2000" dirty="0" smtClean="0"/>
-              <a:t>0x8000 0000 32-bit </a:t>
-            </a:r>
-            <a:r>
-              <a:rPr lang="en-US" sz="2000" dirty="0" smtClean="0"/>
-              <a:t>address &gt;&gt; </a:t>
-            </a:r>
-            <a:r>
-              <a:rPr lang="en-US" sz="2000" dirty="0" smtClean="0"/>
-              <a:t>30</a:t>
-            </a:r>
-            <a:endParaRPr lang="en-US" sz="2000" dirty="0" smtClean="0"/>
+              <a:t> = 0x2; // 0x8000 0000 32-bit address &gt;&gt; 30</a:t>
+            </a:r>
           </a:p>
           <a:p>
             <a:r>
@@ -19114,11 +19088,7 @@
             </a:r>
             <a:r>
               <a:rPr lang="en-US" sz="2000" dirty="0" smtClean="0"/>
-              <a:t>(10,2,&amp;lvSesMpaxh</a:t>
-            </a:r>
-            <a:r>
-              <a:rPr lang="en-US" sz="2000" dirty="0" smtClean="0"/>
-              <a:t>);</a:t>
+              <a:t>(10,2,&amp;lvSesMpaxh);</a:t>
             </a:r>
           </a:p>
           <a:p>
@@ -19126,7 +19096,6 @@
               <a:rPr lang="en-US" sz="2000" dirty="0" smtClean="0"/>
               <a:t>//   For each core chose a different setting, start at core 0</a:t>
             </a:r>
-            <a:endParaRPr lang="en-US" sz="2000" dirty="0" smtClean="0"/>
           </a:p>
           <a:p>
             <a:r>
@@ -19135,31 +19104,7 @@
             </a:r>
             <a:r>
               <a:rPr lang="en-US" sz="2000" dirty="0" smtClean="0"/>
-              <a:t> </a:t>
-            </a:r>
-            <a:r>
-              <a:rPr lang="en-US" sz="2000" dirty="0" smtClean="0"/>
-              <a:t>= </a:t>
-            </a:r>
-            <a:r>
-              <a:rPr lang="en-US" sz="2000" dirty="0" smtClean="0"/>
-              <a:t>0x20; </a:t>
-            </a:r>
-            <a:r>
-              <a:rPr lang="en-US" sz="2000" dirty="0" smtClean="0"/>
-              <a:t>// </a:t>
-            </a:r>
-            <a:r>
-              <a:rPr lang="en-US" sz="2000" dirty="0" smtClean="0"/>
-              <a:t>8 0000 0000 36-bit  </a:t>
-            </a:r>
-            <a:r>
-              <a:rPr lang="en-US" sz="2000" dirty="0" smtClean="0"/>
-              <a:t>&gt;&gt; </a:t>
-            </a:r>
-            <a:r>
-              <a:rPr lang="en-US" sz="2000" dirty="0" smtClean="0"/>
-              <a:t>30   core 0</a:t>
+              <a:t> = 0x20; // 8 0000 0000 36-bit  &gt;&gt; 30   core 0</a:t>
             </a:r>
           </a:p>
           <a:p>
@@ -19169,35 +19114,7 @@
             </a:r>
             <a:r>
               <a:rPr lang="en-US" sz="2000" dirty="0" smtClean="0"/>
-              <a:t> = </a:t>
-            </a:r>
-            <a:r>
-              <a:rPr lang="en-US" sz="2000" dirty="0" smtClean="0"/>
-              <a:t>0x21; </a:t>
-            </a:r>
-            <a:r>
-              <a:rPr lang="en-US" sz="2000" dirty="0" smtClean="0"/>
-              <a:t>// 8 4</a:t>
-            </a:r>
-            <a:r>
-              <a:rPr lang="en-US" sz="2000" dirty="0" smtClean="0"/>
-              <a:t>000 </a:t>
-            </a:r>
-            <a:r>
-              <a:rPr lang="en-US" sz="2000" dirty="0" smtClean="0"/>
-              <a:t>0000 36-bit </a:t>
-            </a:r>
-            <a:r>
-              <a:rPr lang="en-US" sz="2000" dirty="0" smtClean="0"/>
-              <a:t> </a:t>
-            </a:r>
-            <a:r>
-              <a:rPr lang="en-US" sz="2000" dirty="0" smtClean="0"/>
-              <a:t>&gt;&gt; </a:t>
-            </a:r>
-            <a:r>
-              <a:rPr lang="en-US" sz="2000" dirty="0" smtClean="0"/>
-              <a:t>30  core 1</a:t>
+              <a:t> = 0x21; // 8 4000 0000 36-bit  &gt;&gt; 30  core 1</a:t>
             </a:r>
           </a:p>
           <a:p>
@@ -19207,37 +19124,8 @@
             </a:r>
             <a:r>
               <a:rPr lang="en-US" sz="2000" dirty="0" smtClean="0"/>
-              <a:t> = </a:t>
-            </a:r>
-            <a:r>
-              <a:rPr lang="en-US" sz="2000" dirty="0" smtClean="0"/>
-              <a:t>0x22; </a:t>
-            </a:r>
-            <a:r>
-              <a:rPr lang="en-US" sz="2000" dirty="0" smtClean="0"/>
-              <a:t>// 8 8</a:t>
-            </a:r>
-            <a:r>
-              <a:rPr lang="en-US" sz="2000" dirty="0" smtClean="0"/>
-              <a:t>000 </a:t>
-            </a:r>
-            <a:r>
-              <a:rPr lang="en-US" sz="2000" dirty="0" smtClean="0"/>
-              <a:t>0000 36-bit </a:t>
-            </a:r>
-            <a:r>
-              <a:rPr lang="en-US" sz="2000" dirty="0" smtClean="0"/>
-              <a:t> </a:t>
-            </a:r>
-            <a:r>
-              <a:rPr lang="en-US" sz="2000" dirty="0" smtClean="0"/>
-              <a:t>&gt;&gt; </a:t>
-            </a:r>
-            <a:r>
-              <a:rPr lang="en-US" sz="2000" dirty="0" smtClean="0"/>
-              <a:t>30  core 2</a:t>
-            </a:r>
-            <a:endParaRPr lang="en-US" sz="2000" dirty="0" smtClean="0"/>
+              <a:t> = 0x22; // 8 8000 0000 36-bit  &gt;&gt; 30  core 2</a:t>
+            </a:r>
           </a:p>
           <a:p>
             <a:r>
@@ -19246,37 +19134,8 @@
             </a:r>
             <a:r>
               <a:rPr lang="en-US" sz="2000" dirty="0" smtClean="0"/>
-              <a:t> = </a:t>
-            </a:r>
-            <a:r>
-              <a:rPr lang="en-US" sz="2000" dirty="0" smtClean="0"/>
-              <a:t>0x23; </a:t>
-            </a:r>
-            <a:r>
-              <a:rPr lang="en-US" sz="2000" dirty="0" smtClean="0"/>
-              <a:t>// 8 </a:t>
-            </a:r>
-            <a:r>
-              <a:rPr lang="en-US" sz="2000" dirty="0" smtClean="0"/>
-              <a:t>C000 </a:t>
-            </a:r>
-            <a:r>
-              <a:rPr lang="en-US" sz="2000" dirty="0" smtClean="0"/>
-              <a:t>0000 36-bit </a:t>
-            </a:r>
-            <a:r>
-              <a:rPr lang="en-US" sz="2000" dirty="0" smtClean="0"/>
-              <a:t> </a:t>
-            </a:r>
-            <a:r>
-              <a:rPr lang="en-US" sz="2000" dirty="0" smtClean="0"/>
-              <a:t>&gt;&gt; </a:t>
-            </a:r>
-            <a:r>
-              <a:rPr lang="en-US" sz="2000" dirty="0" smtClean="0"/>
-              <a:t>30  core 3</a:t>
-            </a:r>
-            <a:endParaRPr lang="en-US" sz="2000" dirty="0" smtClean="0"/>
+              <a:t> = 0x23; // 8 C000 0000 36-bit  &gt;&gt; 30  core 3</a:t>
+            </a:r>
           </a:p>
           <a:p>
             <a:r>
@@ -19291,29 +19150,8 @@
             </a:r>
             <a:r>
               <a:rPr lang="en-US" sz="2000" dirty="0" smtClean="0"/>
-              <a:t> = </a:t>
-            </a:r>
-            <a:r>
-              <a:rPr lang="en-US" sz="2000" dirty="0" smtClean="0"/>
-              <a:t>0x27; </a:t>
-            </a:r>
-            <a:r>
-              <a:rPr lang="en-US" sz="2000" dirty="0" smtClean="0"/>
-              <a:t>// </a:t>
-            </a:r>
-            <a:r>
-              <a:rPr lang="en-US" sz="2000" dirty="0" smtClean="0"/>
-              <a:t>9 C000 </a:t>
-            </a:r>
-            <a:r>
-              <a:rPr lang="en-US" sz="2000" dirty="0" smtClean="0"/>
-              <a:t>0000 36-bit </a:t>
-            </a:r>
-            <a:r>
-              <a:rPr lang="en-US" sz="2000" dirty="0" smtClean="0"/>
-              <a:t>&gt;&gt; 30  core 7</a:t>
-            </a:r>
-            <a:endParaRPr lang="en-US" sz="2000" dirty="0" smtClean="0"/>
+              <a:t> = 0x27; // 9 C000 0000 36-bit &gt;&gt; 30  core 7</a:t>
+            </a:r>
           </a:p>
           <a:p>
             <a:endParaRPr lang="en-US" sz="2000" dirty="0" smtClean="0"/>
@@ -19387,19 +19225,7 @@
           <a:p>
             <a:r>
               <a:rPr lang="en-US" sz="3600" dirty="0" smtClean="0"/>
-              <a:t>Configure the SES MPAX registers for </a:t>
-            </a:r>
-            <a:r>
-              <a:rPr lang="en-US" sz="3600" dirty="0" smtClean="0"/>
-              <a:t>Non cached 1M of MSMC shared memory</a:t>
-            </a:r>
-            <a:r>
-              <a:rPr lang="en-US" sz="3600" dirty="0" smtClean="0"/>
-              <a:t>– </a:t>
-            </a:r>
-            <a:r>
-              <a:rPr lang="en-US" sz="3600" dirty="0" smtClean="0"/>
-              <a:t>actual code</a:t>
+              <a:t>Configure the SES MPAX registers for Non cached 1M of MSMC shared memory– actual code</a:t>
             </a:r>
             <a:endParaRPr lang="en-US" sz="3600" dirty="0"/>
           </a:p>
@@ -19434,11 +19260,7 @@
           <a:p>
             <a:r>
               <a:rPr lang="en-US" sz="2000" dirty="0" smtClean="0"/>
-              <a:t>// </a:t>
-            </a:r>
-            <a:r>
-              <a:rPr lang="en-US" sz="2000" dirty="0" smtClean="0"/>
-              <a:t>The purpose is to reach MSMC that is not cacheable or pre-fetch</a:t>
+              <a:t>// The purpose is to reach MSMC that is not cacheable or pre-fetch</a:t>
             </a:r>
           </a:p>
           <a:p>
@@ -20865,6 +20687,12 @@
     </p:tnLst>
   </p:timing>
 </p:sld>
+</file>
+
+<file path=ppt/tags/tag1.xml><?xml version="1.0" encoding="utf-8"?>
+<p:tagLst xmlns:a="http://schemas.openxmlformats.org/drawingml/2006/main" xmlns:r="http://schemas.openxmlformats.org/officeDocument/2006/relationships" xmlns:p="http://schemas.openxmlformats.org/presentationml/2006/main">
+  <p:tag name="ARTICULATE_PROJECT_OPEN" val="0"/>
+</p:tagLst>
 </file>
 
 <file path=ppt/theme/theme1.xml><?xml version="1.0" encoding="utf-8"?>

</xml_diff>